<commit_message>
added the work I've been doing with the genetic algorithm the past couple of weeks
</commit_message>
<xml_diff>
--- a/Nathan/grid_search/Grid Search Fitting Methods.pptx
+++ b/Nathan/grid_search/Grid Search Fitting Methods.pptx
@@ -9,13 +9,14 @@
     <p:sldId id="257" r:id="rId3"/>
     <p:sldId id="258" r:id="rId4"/>
     <p:sldId id="259" r:id="rId5"/>
-    <p:sldId id="260" r:id="rId6"/>
-    <p:sldId id="261" r:id="rId7"/>
-    <p:sldId id="262" r:id="rId8"/>
-    <p:sldId id="263" r:id="rId9"/>
-    <p:sldId id="264" r:id="rId10"/>
-    <p:sldId id="265" r:id="rId11"/>
-    <p:sldId id="266" r:id="rId12"/>
+    <p:sldId id="267" r:id="rId6"/>
+    <p:sldId id="260" r:id="rId7"/>
+    <p:sldId id="261" r:id="rId8"/>
+    <p:sldId id="262" r:id="rId9"/>
+    <p:sldId id="263" r:id="rId10"/>
+    <p:sldId id="264" r:id="rId11"/>
+    <p:sldId id="265" r:id="rId12"/>
+    <p:sldId id="266" r:id="rId13"/>
   </p:sldIdLst>
   <p:sldSz cx="12192000" cy="6858000"/>
   <p:notesSz cx="6858000" cy="9144000"/>
@@ -269,7 +270,7 @@
           <a:p>
             <a:fld id="{361176E2-C4A3-F747-BE47-16B8B92C017B}" type="datetimeFigureOut">
               <a:rPr lang="en-US" smtClean="0"/>
-              <a:t>6/26/21</a:t>
+              <a:t>7/2/21</a:t>
             </a:fld>
             <a:endParaRPr lang="en-US"/>
           </a:p>
@@ -467,7 +468,7 @@
           <a:p>
             <a:fld id="{361176E2-C4A3-F747-BE47-16B8B92C017B}" type="datetimeFigureOut">
               <a:rPr lang="en-US" smtClean="0"/>
-              <a:t>6/26/21</a:t>
+              <a:t>7/2/21</a:t>
             </a:fld>
             <a:endParaRPr lang="en-US"/>
           </a:p>
@@ -675,7 +676,7 @@
           <a:p>
             <a:fld id="{361176E2-C4A3-F747-BE47-16B8B92C017B}" type="datetimeFigureOut">
               <a:rPr lang="en-US" smtClean="0"/>
-              <a:t>6/26/21</a:t>
+              <a:t>7/2/21</a:t>
             </a:fld>
             <a:endParaRPr lang="en-US"/>
           </a:p>
@@ -873,7 +874,7 @@
           <a:p>
             <a:fld id="{361176E2-C4A3-F747-BE47-16B8B92C017B}" type="datetimeFigureOut">
               <a:rPr lang="en-US" smtClean="0"/>
-              <a:t>6/26/21</a:t>
+              <a:t>7/2/21</a:t>
             </a:fld>
             <a:endParaRPr lang="en-US"/>
           </a:p>
@@ -1148,7 +1149,7 @@
           <a:p>
             <a:fld id="{361176E2-C4A3-F747-BE47-16B8B92C017B}" type="datetimeFigureOut">
               <a:rPr lang="en-US" smtClean="0"/>
-              <a:t>6/26/21</a:t>
+              <a:t>7/2/21</a:t>
             </a:fld>
             <a:endParaRPr lang="en-US"/>
           </a:p>
@@ -1413,7 +1414,7 @@
           <a:p>
             <a:fld id="{361176E2-C4A3-F747-BE47-16B8B92C017B}" type="datetimeFigureOut">
               <a:rPr lang="en-US" smtClean="0"/>
-              <a:t>6/26/21</a:t>
+              <a:t>7/2/21</a:t>
             </a:fld>
             <a:endParaRPr lang="en-US"/>
           </a:p>
@@ -1825,7 +1826,7 @@
           <a:p>
             <a:fld id="{361176E2-C4A3-F747-BE47-16B8B92C017B}" type="datetimeFigureOut">
               <a:rPr lang="en-US" smtClean="0"/>
-              <a:t>6/26/21</a:t>
+              <a:t>7/2/21</a:t>
             </a:fld>
             <a:endParaRPr lang="en-US"/>
           </a:p>
@@ -1966,7 +1967,7 @@
           <a:p>
             <a:fld id="{361176E2-C4A3-F747-BE47-16B8B92C017B}" type="datetimeFigureOut">
               <a:rPr lang="en-US" smtClean="0"/>
-              <a:t>6/26/21</a:t>
+              <a:t>7/2/21</a:t>
             </a:fld>
             <a:endParaRPr lang="en-US"/>
           </a:p>
@@ -2079,7 +2080,7 @@
           <a:p>
             <a:fld id="{361176E2-C4A3-F747-BE47-16B8B92C017B}" type="datetimeFigureOut">
               <a:rPr lang="en-US" smtClean="0"/>
-              <a:t>6/26/21</a:t>
+              <a:t>7/2/21</a:t>
             </a:fld>
             <a:endParaRPr lang="en-US"/>
           </a:p>
@@ -2390,7 +2391,7 @@
           <a:p>
             <a:fld id="{361176E2-C4A3-F747-BE47-16B8B92C017B}" type="datetimeFigureOut">
               <a:rPr lang="en-US" smtClean="0"/>
-              <a:t>6/26/21</a:t>
+              <a:t>7/2/21</a:t>
             </a:fld>
             <a:endParaRPr lang="en-US"/>
           </a:p>
@@ -2678,7 +2679,7 @@
           <a:p>
             <a:fld id="{361176E2-C4A3-F747-BE47-16B8B92C017B}" type="datetimeFigureOut">
               <a:rPr lang="en-US" smtClean="0"/>
-              <a:t>6/26/21</a:t>
+              <a:t>7/2/21</a:t>
             </a:fld>
             <a:endParaRPr lang="en-US"/>
           </a:p>
@@ -2919,7 +2920,7 @@
           <a:p>
             <a:fld id="{361176E2-C4A3-F747-BE47-16B8B92C017B}" type="datetimeFigureOut">
               <a:rPr lang="en-US" smtClean="0"/>
-              <a:t>6/26/21</a:t>
+              <a:t>7/2/21</a:t>
             </a:fld>
             <a:endParaRPr lang="en-US"/>
           </a:p>
@@ -3437,7 +3438,7 @@
           <p:cNvPr id="4" name="TextBox 3">
             <a:extLst>
               <a:ext uri="{FF2B5EF4-FFF2-40B4-BE49-F238E27FC236}">
-                <a16:creationId xmlns:a16="http://schemas.microsoft.com/office/drawing/2014/main" id="{93C10146-A467-C849-B5A4-CE226D3B6C8F}"/>
+                <a16:creationId xmlns:a16="http://schemas.microsoft.com/office/drawing/2014/main" id="{10017BF9-285B-314C-8AAF-D527E73C5BA0}"/>
               </a:ext>
             </a:extLst>
           </p:cNvPr>
@@ -3463,6 +3464,122 @@
             <a:pPr algn="ctr"/>
             <a:r>
               <a:rPr lang="en-US" sz="6000" dirty="0"/>
+              <a:t>Local Fit Result Narrower</a:t>
+            </a:r>
+            <a:endParaRPr lang="en-US" dirty="0"/>
+          </a:p>
+        </p:txBody>
+      </p:sp>
+      <p:sp>
+        <p:nvSpPr>
+          <p:cNvPr id="5" name="TextBox 4">
+            <a:extLst>
+              <a:ext uri="{FF2B5EF4-FFF2-40B4-BE49-F238E27FC236}">
+                <a16:creationId xmlns:a16="http://schemas.microsoft.com/office/drawing/2014/main" id="{3ABADBB4-6ABE-5B42-AF59-61352C877FDE}"/>
+              </a:ext>
+            </a:extLst>
+          </p:cNvPr>
+          <p:cNvSpPr txBox="1"/>
+          <p:nvPr/>
+        </p:nvSpPr>
+        <p:spPr>
+          <a:xfrm>
+            <a:off x="493853" y="1939351"/>
+            <a:ext cx="11204294" cy="923330"/>
+          </a:xfrm>
+          <a:prstGeom prst="rect">
+            <a:avLst/>
+          </a:prstGeom>
+          <a:noFill/>
+        </p:spPr>
+        <p:txBody>
+          <a:bodyPr wrap="square" rtlCol="0">
+            <a:spAutoFit/>
+          </a:bodyPr>
+          <a:lstStyle/>
+          <a:p>
+            <a:pPr marL="285750" indent="-285750">
+              <a:buFont typeface="Arial" panose="020B0604020202020204" pitchFamily="34" charset="0"/>
+              <a:buChar char="•"/>
+            </a:pPr>
+            <a:r>
+              <a:rPr lang="en-US" dirty="0"/>
+              <a:t>At this point, we can assume that the grid search local fit + result cleaner can produce results that always contain the true values in their error bars.</a:t>
+            </a:r>
+          </a:p>
+          <a:p>
+            <a:pPr marL="285750" indent="-285750">
+              <a:buFont typeface="Arial" panose="020B0604020202020204" pitchFamily="34" charset="0"/>
+              <a:buChar char="•"/>
+            </a:pPr>
+            <a:r>
+              <a:rPr lang="en-US" dirty="0"/>
+              <a:t>The next step is to decrease the error bars so we can have a tighter fit.</a:t>
+            </a:r>
+          </a:p>
+        </p:txBody>
+      </p:sp>
+    </p:spTree>
+    <p:extLst>
+      <p:ext uri="{BB962C8B-B14F-4D97-AF65-F5344CB8AC3E}">
+        <p14:creationId xmlns:p14="http://schemas.microsoft.com/office/powerpoint/2010/main" val="3367370246"/>
+      </p:ext>
+    </p:extLst>
+  </p:cSld>
+  <p:clrMapOvr>
+    <a:masterClrMapping/>
+  </p:clrMapOvr>
+</p:sld>
+</file>
+
+<file path=ppt/slides/slide11.xml><?xml version="1.0" encoding="utf-8"?>
+<p:sld xmlns:a="http://schemas.openxmlformats.org/drawingml/2006/main" xmlns:r="http://schemas.openxmlformats.org/officeDocument/2006/relationships" xmlns:p="http://schemas.openxmlformats.org/presentationml/2006/main">
+  <p:cSld>
+    <p:spTree>
+      <p:nvGrpSpPr>
+        <p:cNvPr id="1" name=""/>
+        <p:cNvGrpSpPr/>
+        <p:nvPr/>
+      </p:nvGrpSpPr>
+      <p:grpSpPr>
+        <a:xfrm>
+          <a:off x="0" y="0"/>
+          <a:ext cx="0" cy="0"/>
+          <a:chOff x="0" y="0"/>
+          <a:chExt cx="0" cy="0"/>
+        </a:xfrm>
+      </p:grpSpPr>
+      <p:sp>
+        <p:nvSpPr>
+          <p:cNvPr id="4" name="TextBox 3">
+            <a:extLst>
+              <a:ext uri="{FF2B5EF4-FFF2-40B4-BE49-F238E27FC236}">
+                <a16:creationId xmlns:a16="http://schemas.microsoft.com/office/drawing/2014/main" id="{93C10146-A467-C849-B5A4-CE226D3B6C8F}"/>
+              </a:ext>
+            </a:extLst>
+          </p:cNvPr>
+          <p:cNvSpPr txBox="1"/>
+          <p:nvPr/>
+        </p:nvSpPr>
+        <p:spPr>
+          <a:xfrm>
+            <a:off x="0" y="520861"/>
+            <a:ext cx="12192000" cy="1015663"/>
+          </a:xfrm>
+          <a:prstGeom prst="rect">
+            <a:avLst/>
+          </a:prstGeom>
+          <a:noFill/>
+        </p:spPr>
+        <p:txBody>
+          <a:bodyPr wrap="square" rtlCol="0">
+            <a:spAutoFit/>
+          </a:bodyPr>
+          <a:lstStyle/>
+          <a:p>
+            <a:pPr algn="ctr"/>
+            <a:r>
+              <a:rPr lang="en-US" sz="6000" dirty="0"/>
               <a:t>Grid Search Global Fit Algorithm</a:t>
             </a:r>
             <a:endParaRPr lang="en-US" dirty="0"/>
@@ -3542,8 +3659,8 @@
           </a:p>
         </p:txBody>
       </p:sp>
-      <mc:AlternateContent xmlns:mc="http://schemas.openxmlformats.org/markup-compatibility/2006">
-        <mc:Choice xmlns:a14="http://schemas.microsoft.com/office/drawing/2010/main" Requires="a14">
+      <mc:AlternateContent xmlns:mc="http://schemas.openxmlformats.org/markup-compatibility/2006" xmlns:a14="http://schemas.microsoft.com/office/drawing/2010/main">
+        <mc:Choice Requires="a14">
           <p:sp>
             <p:nvSpPr>
               <p:cNvPr id="6" name="TextBox 5">
@@ -4043,7 +4160,7 @@
             </p:txBody>
           </p:sp>
         </mc:Choice>
-        <mc:Fallback>
+        <mc:Fallback xmlns="">
           <p:sp>
             <p:nvSpPr>
               <p:cNvPr id="6" name="TextBox 5">
@@ -4194,7 +4311,7 @@
 </p:sld>
 </file>
 
-<file path=ppt/slides/slide11.xml><?xml version="1.0" encoding="utf-8"?>
+<file path=ppt/slides/slide12.xml><?xml version="1.0" encoding="utf-8"?>
 <p:sld xmlns:a="http://schemas.openxmlformats.org/drawingml/2006/main" xmlns:r="http://schemas.openxmlformats.org/officeDocument/2006/relationships" xmlns:p="http://schemas.openxmlformats.org/presentationml/2006/main">
   <p:cSld>
     <p:spTree>
@@ -5463,6 +5580,103 @@
           <p:cNvPr id="4" name="TextBox 3">
             <a:extLst>
               <a:ext uri="{FF2B5EF4-FFF2-40B4-BE49-F238E27FC236}">
+                <a16:creationId xmlns:a16="http://schemas.microsoft.com/office/drawing/2014/main" id="{897BB8A5-779B-CC4A-A27C-1FFE8ECAA121}"/>
+              </a:ext>
+            </a:extLst>
+          </p:cNvPr>
+          <p:cNvSpPr txBox="1"/>
+          <p:nvPr/>
+        </p:nvSpPr>
+        <p:spPr>
+          <a:xfrm>
+            <a:off x="-1" y="138896"/>
+            <a:ext cx="12192000" cy="1015663"/>
+          </a:xfrm>
+          <a:prstGeom prst="rect">
+            <a:avLst/>
+          </a:prstGeom>
+          <a:noFill/>
+        </p:spPr>
+        <p:txBody>
+          <a:bodyPr wrap="square" rtlCol="0">
+            <a:spAutoFit/>
+          </a:bodyPr>
+          <a:lstStyle/>
+          <a:p>
+            <a:pPr algn="ctr"/>
+            <a:r>
+              <a:rPr lang="en-US" sz="6000" dirty="0"/>
+              <a:t>Grid Search Local Fit Results</a:t>
+            </a:r>
+            <a:endParaRPr lang="en-US" dirty="0"/>
+          </a:p>
+        </p:txBody>
+      </p:sp>
+      <p:pic>
+        <p:nvPicPr>
+          <p:cNvPr id="6" name="Picture 5" descr="Chart, box and whisker chart&#10;&#10;Description automatically generated">
+            <a:extLst>
+              <a:ext uri="{FF2B5EF4-FFF2-40B4-BE49-F238E27FC236}">
+                <a16:creationId xmlns:a16="http://schemas.microsoft.com/office/drawing/2014/main" id="{DE33161C-2EA5-5E42-943B-123020B123C0}"/>
+              </a:ext>
+            </a:extLst>
+          </p:cNvPr>
+          <p:cNvPicPr>
+            <a:picLocks noChangeAspect="1"/>
+          </p:cNvPicPr>
+          <p:nvPr/>
+        </p:nvPicPr>
+        <p:blipFill>
+          <a:blip r:embed="rId2"/>
+          <a:stretch>
+            <a:fillRect/>
+          </a:stretch>
+        </p:blipFill>
+        <p:spPr>
+          <a:xfrm>
+            <a:off x="1460499" y="1156504"/>
+            <a:ext cx="9271000" cy="5562600"/>
+          </a:xfrm>
+          <a:prstGeom prst="rect">
+            <a:avLst/>
+          </a:prstGeom>
+        </p:spPr>
+      </p:pic>
+    </p:spTree>
+    <p:extLst>
+      <p:ext uri="{BB962C8B-B14F-4D97-AF65-F5344CB8AC3E}">
+        <p14:creationId xmlns:p14="http://schemas.microsoft.com/office/powerpoint/2010/main" val="2539400865"/>
+      </p:ext>
+    </p:extLst>
+  </p:cSld>
+  <p:clrMapOvr>
+    <a:masterClrMapping/>
+  </p:clrMapOvr>
+</p:sld>
+</file>
+
+<file path=ppt/slides/slide6.xml><?xml version="1.0" encoding="utf-8"?>
+<p:sld xmlns:a="http://schemas.openxmlformats.org/drawingml/2006/main" xmlns:r="http://schemas.openxmlformats.org/officeDocument/2006/relationships" xmlns:p="http://schemas.openxmlformats.org/presentationml/2006/main">
+  <p:cSld>
+    <p:spTree>
+      <p:nvGrpSpPr>
+        <p:cNvPr id="1" name=""/>
+        <p:cNvGrpSpPr/>
+        <p:nvPr/>
+      </p:nvGrpSpPr>
+      <p:grpSpPr>
+        <a:xfrm>
+          <a:off x="0" y="0"/>
+          <a:ext cx="0" cy="0"/>
+          <a:chOff x="0" y="0"/>
+          <a:chExt cx="0" cy="0"/>
+        </a:xfrm>
+      </p:grpSpPr>
+      <p:sp>
+        <p:nvSpPr>
+          <p:cNvPr id="4" name="TextBox 3">
+            <a:extLst>
+              <a:ext uri="{FF2B5EF4-FFF2-40B4-BE49-F238E27FC236}">
                 <a16:creationId xmlns:a16="http://schemas.microsoft.com/office/drawing/2014/main" id="{47630578-4968-B840-B9E8-5F0FF8DDBFE0}"/>
               </a:ext>
             </a:extLst>
@@ -5538,7 +5752,7 @@
 </p:sld>
 </file>
 
-<file path=ppt/slides/slide6.xml><?xml version="1.0" encoding="utf-8"?>
+<file path=ppt/slides/slide7.xml><?xml version="1.0" encoding="utf-8"?>
 <p:sld xmlns:a="http://schemas.openxmlformats.org/drawingml/2006/main" xmlns:r="http://schemas.openxmlformats.org/officeDocument/2006/relationships" xmlns:p="http://schemas.openxmlformats.org/presentationml/2006/main">
   <p:cSld>
     <p:spTree>
@@ -5635,7 +5849,7 @@
 </p:sld>
 </file>
 
-<file path=ppt/slides/slide7.xml><?xml version="1.0" encoding="utf-8"?>
+<file path=ppt/slides/slide8.xml><?xml version="1.0" encoding="utf-8"?>
 <p:sld xmlns:a="http://schemas.openxmlformats.org/drawingml/2006/main" xmlns:r="http://schemas.openxmlformats.org/officeDocument/2006/relationships" xmlns:p="http://schemas.openxmlformats.org/presentationml/2006/main">
   <p:cSld>
     <p:spTree>
@@ -5797,7 +6011,7 @@
 </p:sld>
 </file>
 
-<file path=ppt/slides/slide8.xml><?xml version="1.0" encoding="utf-8"?>
+<file path=ppt/slides/slide9.xml><?xml version="1.0" encoding="utf-8"?>
 <p:sld xmlns:a="http://schemas.openxmlformats.org/drawingml/2006/main" xmlns:r="http://schemas.openxmlformats.org/officeDocument/2006/relationships" xmlns:p="http://schemas.openxmlformats.org/presentationml/2006/main">
   <p:cSld>
     <p:spTree>
@@ -5932,122 +6146,6 @@
     <p:extLst>
       <p:ext uri="{BB962C8B-B14F-4D97-AF65-F5344CB8AC3E}">
         <p14:creationId xmlns:p14="http://schemas.microsoft.com/office/powerpoint/2010/main" val="2484812665"/>
-      </p:ext>
-    </p:extLst>
-  </p:cSld>
-  <p:clrMapOvr>
-    <a:masterClrMapping/>
-  </p:clrMapOvr>
-</p:sld>
-</file>
-
-<file path=ppt/slides/slide9.xml><?xml version="1.0" encoding="utf-8"?>
-<p:sld xmlns:a="http://schemas.openxmlformats.org/drawingml/2006/main" xmlns:r="http://schemas.openxmlformats.org/officeDocument/2006/relationships" xmlns:p="http://schemas.openxmlformats.org/presentationml/2006/main">
-  <p:cSld>
-    <p:spTree>
-      <p:nvGrpSpPr>
-        <p:cNvPr id="1" name=""/>
-        <p:cNvGrpSpPr/>
-        <p:nvPr/>
-      </p:nvGrpSpPr>
-      <p:grpSpPr>
-        <a:xfrm>
-          <a:off x="0" y="0"/>
-          <a:ext cx="0" cy="0"/>
-          <a:chOff x="0" y="0"/>
-          <a:chExt cx="0" cy="0"/>
-        </a:xfrm>
-      </p:grpSpPr>
-      <p:sp>
-        <p:nvSpPr>
-          <p:cNvPr id="4" name="TextBox 3">
-            <a:extLst>
-              <a:ext uri="{FF2B5EF4-FFF2-40B4-BE49-F238E27FC236}">
-                <a16:creationId xmlns:a16="http://schemas.microsoft.com/office/drawing/2014/main" id="{10017BF9-285B-314C-8AAF-D527E73C5BA0}"/>
-              </a:ext>
-            </a:extLst>
-          </p:cNvPr>
-          <p:cNvSpPr txBox="1"/>
-          <p:nvPr/>
-        </p:nvSpPr>
-        <p:spPr>
-          <a:xfrm>
-            <a:off x="0" y="520861"/>
-            <a:ext cx="12192000" cy="1015663"/>
-          </a:xfrm>
-          <a:prstGeom prst="rect">
-            <a:avLst/>
-          </a:prstGeom>
-          <a:noFill/>
-        </p:spPr>
-        <p:txBody>
-          <a:bodyPr wrap="square" rtlCol="0">
-            <a:spAutoFit/>
-          </a:bodyPr>
-          <a:lstStyle/>
-          <a:p>
-            <a:pPr algn="ctr"/>
-            <a:r>
-              <a:rPr lang="en-US" sz="6000" dirty="0"/>
-              <a:t>Local Fit Result Narrower</a:t>
-            </a:r>
-            <a:endParaRPr lang="en-US" dirty="0"/>
-          </a:p>
-        </p:txBody>
-      </p:sp>
-      <p:sp>
-        <p:nvSpPr>
-          <p:cNvPr id="5" name="TextBox 4">
-            <a:extLst>
-              <a:ext uri="{FF2B5EF4-FFF2-40B4-BE49-F238E27FC236}">
-                <a16:creationId xmlns:a16="http://schemas.microsoft.com/office/drawing/2014/main" id="{3ABADBB4-6ABE-5B42-AF59-61352C877FDE}"/>
-              </a:ext>
-            </a:extLst>
-          </p:cNvPr>
-          <p:cNvSpPr txBox="1"/>
-          <p:nvPr/>
-        </p:nvSpPr>
-        <p:spPr>
-          <a:xfrm>
-            <a:off x="493853" y="1939351"/>
-            <a:ext cx="11204294" cy="923330"/>
-          </a:xfrm>
-          <a:prstGeom prst="rect">
-            <a:avLst/>
-          </a:prstGeom>
-          <a:noFill/>
-        </p:spPr>
-        <p:txBody>
-          <a:bodyPr wrap="square" rtlCol="0">
-            <a:spAutoFit/>
-          </a:bodyPr>
-          <a:lstStyle/>
-          <a:p>
-            <a:pPr marL="285750" indent="-285750">
-              <a:buFont typeface="Arial" panose="020B0604020202020204" pitchFamily="34" charset="0"/>
-              <a:buChar char="•"/>
-            </a:pPr>
-            <a:r>
-              <a:rPr lang="en-US" dirty="0"/>
-              <a:t>At this point, we can assume that the grid search local fit + result cleaner can produce results that always contain the true values in their error bars.</a:t>
-            </a:r>
-          </a:p>
-          <a:p>
-            <a:pPr marL="285750" indent="-285750">
-              <a:buFont typeface="Arial" panose="020B0604020202020204" pitchFamily="34" charset="0"/>
-              <a:buChar char="•"/>
-            </a:pPr>
-            <a:r>
-              <a:rPr lang="en-US" dirty="0"/>
-              <a:t>The next step is to decrease the error bars so we can have a tighter fit.</a:t>
-            </a:r>
-          </a:p>
-        </p:txBody>
-      </p:sp>
-    </p:spTree>
-    <p:extLst>
-      <p:ext uri="{BB962C8B-B14F-4D97-AF65-F5344CB8AC3E}">
-        <p14:creationId xmlns:p14="http://schemas.microsoft.com/office/powerpoint/2010/main" val="3367370246"/>
       </p:ext>
     </p:extLst>
   </p:cSld>

</xml_diff>